<commit_message>
new layout of pdf output
</commit_message>
<xml_diff>
--- a/images/cover.pptx
+++ b/images/cover.pptx
@@ -288,7 +288,7 @@
           <a:p>
             <a:fld id="{8637B872-3447-4B35-BFC9-9F823D06BCDA}" type="datetimeFigureOut">
               <a:rPr lang="en-US" smtClean="0"/>
-              <a:t>5/10/2017</a:t>
+              <a:t>5/11/2017</a:t>
             </a:fld>
             <a:endParaRPr lang="en-US"/>
           </a:p>
@@ -458,7 +458,7 @@
           <a:p>
             <a:fld id="{8637B872-3447-4B35-BFC9-9F823D06BCDA}" type="datetimeFigureOut">
               <a:rPr lang="en-US" smtClean="0"/>
-              <a:t>5/10/2017</a:t>
+              <a:t>5/11/2017</a:t>
             </a:fld>
             <a:endParaRPr lang="en-US"/>
           </a:p>
@@ -638,7 +638,7 @@
           <a:p>
             <a:fld id="{8637B872-3447-4B35-BFC9-9F823D06BCDA}" type="datetimeFigureOut">
               <a:rPr lang="en-US" smtClean="0"/>
-              <a:t>5/10/2017</a:t>
+              <a:t>5/11/2017</a:t>
             </a:fld>
             <a:endParaRPr lang="en-US"/>
           </a:p>
@@ -808,7 +808,7 @@
           <a:p>
             <a:fld id="{8637B872-3447-4B35-BFC9-9F823D06BCDA}" type="datetimeFigureOut">
               <a:rPr lang="en-US" smtClean="0"/>
-              <a:t>5/10/2017</a:t>
+              <a:t>5/11/2017</a:t>
             </a:fld>
             <a:endParaRPr lang="en-US"/>
           </a:p>
@@ -1054,7 +1054,7 @@
           <a:p>
             <a:fld id="{8637B872-3447-4B35-BFC9-9F823D06BCDA}" type="datetimeFigureOut">
               <a:rPr lang="en-US" smtClean="0"/>
-              <a:t>5/10/2017</a:t>
+              <a:t>5/11/2017</a:t>
             </a:fld>
             <a:endParaRPr lang="en-US"/>
           </a:p>
@@ -1342,7 +1342,7 @@
           <a:p>
             <a:fld id="{8637B872-3447-4B35-BFC9-9F823D06BCDA}" type="datetimeFigureOut">
               <a:rPr lang="en-US" smtClean="0"/>
-              <a:t>5/10/2017</a:t>
+              <a:t>5/11/2017</a:t>
             </a:fld>
             <a:endParaRPr lang="en-US"/>
           </a:p>
@@ -1764,7 +1764,7 @@
           <a:p>
             <a:fld id="{8637B872-3447-4B35-BFC9-9F823D06BCDA}" type="datetimeFigureOut">
               <a:rPr lang="en-US" smtClean="0"/>
-              <a:t>5/10/2017</a:t>
+              <a:t>5/11/2017</a:t>
             </a:fld>
             <a:endParaRPr lang="en-US"/>
           </a:p>
@@ -1882,7 +1882,7 @@
           <a:p>
             <a:fld id="{8637B872-3447-4B35-BFC9-9F823D06BCDA}" type="datetimeFigureOut">
               <a:rPr lang="en-US" smtClean="0"/>
-              <a:t>5/10/2017</a:t>
+              <a:t>5/11/2017</a:t>
             </a:fld>
             <a:endParaRPr lang="en-US"/>
           </a:p>
@@ -1977,7 +1977,7 @@
           <a:p>
             <a:fld id="{8637B872-3447-4B35-BFC9-9F823D06BCDA}" type="datetimeFigureOut">
               <a:rPr lang="en-US" smtClean="0"/>
-              <a:t>5/10/2017</a:t>
+              <a:t>5/11/2017</a:t>
             </a:fld>
             <a:endParaRPr lang="en-US"/>
           </a:p>
@@ -2254,7 +2254,7 @@
           <a:p>
             <a:fld id="{8637B872-3447-4B35-BFC9-9F823D06BCDA}" type="datetimeFigureOut">
               <a:rPr lang="en-US" smtClean="0"/>
-              <a:t>5/10/2017</a:t>
+              <a:t>5/11/2017</a:t>
             </a:fld>
             <a:endParaRPr lang="en-US"/>
           </a:p>
@@ -2507,7 +2507,7 @@
           <a:p>
             <a:fld id="{8637B872-3447-4B35-BFC9-9F823D06BCDA}" type="datetimeFigureOut">
               <a:rPr lang="en-US" smtClean="0"/>
-              <a:t>5/10/2017</a:t>
+              <a:t>5/11/2017</a:t>
             </a:fld>
             <a:endParaRPr lang="en-US"/>
           </a:p>
@@ -2720,7 +2720,7 @@
           <a:p>
             <a:fld id="{8637B872-3447-4B35-BFC9-9F823D06BCDA}" type="datetimeFigureOut">
               <a:rPr lang="en-US" smtClean="0"/>
-              <a:t>5/10/2017</a:t>
+              <a:t>5/11/2017</a:t>
             </a:fld>
             <a:endParaRPr lang="en-US"/>
           </a:p>
@@ -3222,14 +3222,32 @@
           <a:p>
             <a:pPr algn="ctr"/>
             <a:r>
-              <a:rPr lang="en-GB" dirty="0"/>
+              <a:rPr lang="en-GB" dirty="0">
+                <a:solidFill>
+                  <a:schemeClr val="bg1">
+                    <a:lumMod val="50000"/>
+                  </a:schemeClr>
+                </a:solidFill>
+              </a:rPr>
               <a:t>Authoring Articles, Mails, Guitar books, Chemical Molecular Formulae and Equations with R </a:t>
             </a:r>
             <a:r>
-              <a:rPr lang="en-GB" dirty="0" err="1" smtClean="0"/>
+              <a:rPr lang="en-GB" dirty="0" err="1" smtClean="0">
+                <a:solidFill>
+                  <a:schemeClr val="bg1">
+                    <a:lumMod val="50000"/>
+                  </a:schemeClr>
+                </a:solidFill>
+              </a:rPr>
               <a:t>bookdown</a:t>
             </a:r>
-            <a:endParaRPr lang="en-GB" dirty="0" smtClean="0"/>
+            <a:endParaRPr lang="en-GB" dirty="0" smtClean="0">
+              <a:solidFill>
+                <a:schemeClr val="bg1">
+                  <a:lumMod val="50000"/>
+                </a:schemeClr>
+              </a:solidFill>
+            </a:endParaRPr>
           </a:p>
           <a:p>
             <a:pPr algn="ctr"/>
@@ -3242,10 +3260,10 @@
           <a:p>
             <a:pPr algn="ctr"/>
             <a:r>
-              <a:rPr lang="en-GB" dirty="0" smtClean="0"/>
+              <a:rPr lang="en-GB" b="1" dirty="0" smtClean="0"/>
               <a:t>Peng Zhao</a:t>
             </a:r>
-            <a:endParaRPr lang="en-GB" dirty="0"/>
+            <a:endParaRPr lang="en-GB" b="1" dirty="0"/>
           </a:p>
         </p:txBody>
       </p:sp>

</xml_diff>